<commit_message>
Update Spark Funds Presentation.pptx
</commit_message>
<xml_diff>
--- a/Spark Funds Presentation.pptx
+++ b/Spark Funds Presentation.pptx
@@ -5,19 +5,21 @@
     <p:sldMasterId id="2147483660" r:id="rId1"/>
   </p:sldMasterIdLst>
   <p:notesMasterIdLst>
-    <p:notesMasterId r:id="rId12"/>
+    <p:notesMasterId r:id="rId14"/>
   </p:notesMasterIdLst>
   <p:sldIdLst>
     <p:sldId id="256" r:id="rId2"/>
     <p:sldId id="257" r:id="rId3"/>
     <p:sldId id="258" r:id="rId4"/>
     <p:sldId id="259" r:id="rId5"/>
-    <p:sldId id="260" r:id="rId6"/>
-    <p:sldId id="267" r:id="rId7"/>
-    <p:sldId id="262" r:id="rId8"/>
-    <p:sldId id="268" r:id="rId9"/>
-    <p:sldId id="269" r:id="rId10"/>
-    <p:sldId id="265" r:id="rId11"/>
+    <p:sldId id="270" r:id="rId6"/>
+    <p:sldId id="271" r:id="rId7"/>
+    <p:sldId id="272" r:id="rId8"/>
+    <p:sldId id="262" r:id="rId9"/>
+    <p:sldId id="268" r:id="rId10"/>
+    <p:sldId id="269" r:id="rId11"/>
+    <p:sldId id="273" r:id="rId12"/>
+    <p:sldId id="265" r:id="rId13"/>
   </p:sldIdLst>
   <p:sldSz cx="12192000" cy="6858000"/>
   <p:notesSz cx="6858000" cy="9144000"/>
@@ -209,7 +211,7 @@
           <a:p>
             <a:fld id="{2E309023-AF2B-4043-B228-F191CADC9BB1}" type="datetimeFigureOut">
               <a:rPr lang="en-IN" smtClean="0"/>
-              <a:t>06-04-2017</a:t>
+              <a:t>01-02-2019</a:t>
             </a:fld>
             <a:endParaRPr lang="en-IN"/>
           </a:p>
@@ -608,7 +610,7 @@
           <a:p>
             <a:fld id="{70C018FE-C8D6-4A9C-A702-41F1E0C1C452}" type="datetimeFigureOut">
               <a:rPr lang="en-IN" smtClean="0"/>
-              <a:t>06-04-2017</a:t>
+              <a:t>01-02-2019</a:t>
             </a:fld>
             <a:endParaRPr lang="en-IN"/>
           </a:p>
@@ -778,7 +780,7 @@
           <a:p>
             <a:fld id="{70C018FE-C8D6-4A9C-A702-41F1E0C1C452}" type="datetimeFigureOut">
               <a:rPr lang="en-IN" smtClean="0"/>
-              <a:t>06-04-2017</a:t>
+              <a:t>01-02-2019</a:t>
             </a:fld>
             <a:endParaRPr lang="en-IN"/>
           </a:p>
@@ -958,7 +960,7 @@
           <a:p>
             <a:fld id="{70C018FE-C8D6-4A9C-A702-41F1E0C1C452}" type="datetimeFigureOut">
               <a:rPr lang="en-IN" smtClean="0"/>
-              <a:t>06-04-2017</a:t>
+              <a:t>01-02-2019</a:t>
             </a:fld>
             <a:endParaRPr lang="en-IN"/>
           </a:p>
@@ -1390,7 +1392,7 @@
           <a:p>
             <a:fld id="{70C018FE-C8D6-4A9C-A702-41F1E0C1C452}" type="datetimeFigureOut">
               <a:rPr lang="en-IN" smtClean="0"/>
-              <a:t>06-04-2017</a:t>
+              <a:t>01-02-2019</a:t>
             </a:fld>
             <a:endParaRPr lang="en-IN"/>
           </a:p>
@@ -1622,7 +1624,7 @@
           <a:p>
             <a:fld id="{70C018FE-C8D6-4A9C-A702-41F1E0C1C452}" type="datetimeFigureOut">
               <a:rPr lang="en-IN" smtClean="0"/>
-              <a:t>06-04-2017</a:t>
+              <a:t>01-02-2019</a:t>
             </a:fld>
             <a:endParaRPr lang="en-IN"/>
           </a:p>
@@ -1989,7 +1991,7 @@
           <a:p>
             <a:fld id="{70C018FE-C8D6-4A9C-A702-41F1E0C1C452}" type="datetimeFigureOut">
               <a:rPr lang="en-IN" smtClean="0"/>
-              <a:t>06-04-2017</a:t>
+              <a:t>01-02-2019</a:t>
             </a:fld>
             <a:endParaRPr lang="en-IN"/>
           </a:p>
@@ -2107,7 +2109,7 @@
           <a:p>
             <a:fld id="{70C018FE-C8D6-4A9C-A702-41F1E0C1C452}" type="datetimeFigureOut">
               <a:rPr lang="en-IN" smtClean="0"/>
-              <a:t>06-04-2017</a:t>
+              <a:t>01-02-2019</a:t>
             </a:fld>
             <a:endParaRPr lang="en-IN"/>
           </a:p>
@@ -2202,7 +2204,7 @@
           <a:p>
             <a:fld id="{70C018FE-C8D6-4A9C-A702-41F1E0C1C452}" type="datetimeFigureOut">
               <a:rPr lang="en-IN" smtClean="0"/>
-              <a:t>06-04-2017</a:t>
+              <a:t>01-02-2019</a:t>
             </a:fld>
             <a:endParaRPr lang="en-IN"/>
           </a:p>
@@ -2478,7 +2480,7 @@
           <a:p>
             <a:fld id="{70C018FE-C8D6-4A9C-A702-41F1E0C1C452}" type="datetimeFigureOut">
               <a:rPr lang="en-IN" smtClean="0"/>
-              <a:t>06-04-2017</a:t>
+              <a:t>01-02-2019</a:t>
             </a:fld>
             <a:endParaRPr lang="en-IN"/>
           </a:p>
@@ -2735,7 +2737,7 @@
           <a:p>
             <a:fld id="{70C018FE-C8D6-4A9C-A702-41F1E0C1C452}" type="datetimeFigureOut">
               <a:rPr lang="en-IN" smtClean="0"/>
-              <a:t>06-04-2017</a:t>
+              <a:t>01-02-2019</a:t>
             </a:fld>
             <a:endParaRPr lang="en-IN"/>
           </a:p>
@@ -2946,7 +2948,7 @@
           <a:p>
             <a:fld id="{70C018FE-C8D6-4A9C-A702-41F1E0C1C452}" type="datetimeFigureOut">
               <a:rPr lang="en-IN" smtClean="0"/>
-              <a:t>06-04-2017</a:t>
+              <a:t>01-02-2019</a:t>
             </a:fld>
             <a:endParaRPr lang="en-IN" dirty="0"/>
           </a:p>
@@ -3514,7 +3516,15 @@
             </a:pPr>
             <a:r>
               <a:rPr lang="en-IN" sz="1800" dirty="0"/>
-              <a:t> Member name</a:t>
+              <a:t> </a:t>
+            </a:r>
+            <a:r>
+              <a:rPr lang="en-IN" sz="1800" dirty="0" err="1"/>
+              <a:t>Abhijith</a:t>
+            </a:r>
+            <a:r>
+              <a:rPr lang="en-IN" sz="1800" dirty="0"/>
+              <a:t> NV</a:t>
             </a:r>
           </a:p>
           <a:p>
@@ -3524,7 +3534,7 @@
             </a:pPr>
             <a:r>
               <a:rPr lang="en-IN" sz="1800" dirty="0"/>
-              <a:t> Member name</a:t>
+              <a:t> Srividya Ravichandran</a:t>
             </a:r>
           </a:p>
           <a:p>
@@ -3534,7 +3544,15 @@
             </a:pPr>
             <a:r>
               <a:rPr lang="en-IN" sz="1800" dirty="0"/>
-              <a:t> Member name</a:t>
+              <a:t> </a:t>
+            </a:r>
+            <a:r>
+              <a:rPr lang="en-IN" sz="1800" dirty="0" err="1"/>
+              <a:t>Nanditha</a:t>
+            </a:r>
+            <a:r>
+              <a:rPr lang="en-IN" sz="1800" dirty="0"/>
+              <a:t> GN</a:t>
             </a:r>
           </a:p>
           <a:p>
@@ -3544,7 +3562,7 @@
             </a:pPr>
             <a:r>
               <a:rPr lang="en-IN" sz="1800" dirty="0"/>
-              <a:t> Member name</a:t>
+              <a:t> Krishnan Raghupathi</a:t>
             </a:r>
           </a:p>
           <a:p>
@@ -3588,31 +3606,7 @@
       </p:grpSpPr>
       <p:sp>
         <p:nvSpPr>
-          <p:cNvPr id="3" name="Content Placeholder 2"/>
-          <p:cNvSpPr>
-            <a:spLocks noGrp="1"/>
-          </p:cNvSpPr>
-          <p:nvPr>
-            <p:ph idx="1"/>
-          </p:nvPr>
-        </p:nvSpPr>
-        <p:spPr/>
-        <p:txBody>
-          <a:bodyPr>
-            <a:normAutofit/>
-          </a:bodyPr>
-          <a:lstStyle/>
-          <a:p>
-            <a:pPr marL="0" indent="0">
-              <a:buNone/>
-            </a:pPr>
-            <a:endParaRPr lang="en-IN" sz="1400" dirty="0"/>
-          </a:p>
-        </p:txBody>
-      </p:sp>
-      <p:sp>
-        <p:nvSpPr>
-          <p:cNvPr id="5" name="Title 1"/>
+          <p:cNvPr id="6" name="Title 1"/>
           <p:cNvSpPr>
             <a:spLocks noGrp="1"/>
           </p:cNvSpPr>
@@ -3635,8 +3629,193 @@
               <a:t> </a:t>
             </a:r>
             <a:r>
-              <a:rPr lang="en-IN" sz="2800" dirty="0"/>
-              <a:t>&lt;Conclusions&gt;</a:t>
+              <a:rPr lang="en-IN" sz="2800" b="1" dirty="0"/>
+              <a:t>Plot 3 – # of investments across countries and sectors</a:t>
+            </a:r>
+            <a:endParaRPr lang="en-IN" sz="2800" dirty="0"/>
+          </a:p>
+        </p:txBody>
+      </p:sp>
+    </p:spTree>
+    <p:extLst>
+      <p:ext uri="{BB962C8B-B14F-4D97-AF65-F5344CB8AC3E}">
+        <p14:creationId xmlns:p14="http://schemas.microsoft.com/office/powerpoint/2010/main" val="1835958945"/>
+      </p:ext>
+    </p:extLst>
+  </p:cSld>
+  <p:clrMapOvr>
+    <a:masterClrMapping/>
+  </p:clrMapOvr>
+</p:sld>
+</file>
+
+<file path=ppt/slides/slide11.xml><?xml version="1.0" encoding="utf-8"?>
+<p:sld xmlns:a="http://schemas.openxmlformats.org/drawingml/2006/main" xmlns:r="http://schemas.openxmlformats.org/officeDocument/2006/relationships" xmlns:p="http://schemas.openxmlformats.org/presentationml/2006/main">
+  <p:cSld>
+    <p:spTree>
+      <p:nvGrpSpPr>
+        <p:cNvPr id="1" name=""/>
+        <p:cNvGrpSpPr/>
+        <p:nvPr/>
+      </p:nvGrpSpPr>
+      <p:grpSpPr>
+        <a:xfrm>
+          <a:off x="0" y="0"/>
+          <a:ext cx="0" cy="0"/>
+          <a:chOff x="0" y="0"/>
+          <a:chExt cx="0" cy="0"/>
+        </a:xfrm>
+      </p:grpSpPr>
+      <p:sp>
+        <p:nvSpPr>
+          <p:cNvPr id="3" name="Content Placeholder 2"/>
+          <p:cNvSpPr>
+            <a:spLocks noGrp="1"/>
+          </p:cNvSpPr>
+          <p:nvPr>
+            <p:ph idx="1"/>
+          </p:nvPr>
+        </p:nvSpPr>
+        <p:spPr/>
+        <p:txBody>
+          <a:bodyPr>
+            <a:normAutofit/>
+          </a:bodyPr>
+          <a:lstStyle/>
+          <a:p>
+            <a:pPr marL="0" indent="0">
+              <a:buNone/>
+            </a:pPr>
+            <a:r>
+              <a:rPr lang="en-IN" sz="1400" dirty="0"/>
+              <a:t> Put down our inferences after analysis &amp; observations from the excel sheet and the 3 plots</a:t>
+            </a:r>
+          </a:p>
+        </p:txBody>
+      </p:sp>
+      <p:sp>
+        <p:nvSpPr>
+          <p:cNvPr id="6" name="Title 1">
+            <a:extLst>
+              <a:ext uri="{FF2B5EF4-FFF2-40B4-BE49-F238E27FC236}">
+                <a16:creationId xmlns:a16="http://schemas.microsoft.com/office/drawing/2014/main" id="{C9ED24FB-F1DF-43A2-A28A-E1B9714DF31A}"/>
+              </a:ext>
+            </a:extLst>
+          </p:cNvPr>
+          <p:cNvSpPr>
+            <a:spLocks noGrp="1"/>
+          </p:cNvSpPr>
+          <p:nvPr>
+            <p:ph type="title"/>
+          </p:nvPr>
+        </p:nvSpPr>
+        <p:spPr>
+          <a:xfrm>
+            <a:off x="404949" y="800336"/>
+            <a:ext cx="11168742" cy="856138"/>
+          </a:xfrm>
+        </p:spPr>
+        <p:txBody>
+          <a:bodyPr>
+            <a:normAutofit/>
+          </a:bodyPr>
+          <a:lstStyle/>
+          <a:p>
+            <a:r>
+              <a:rPr lang="en-IN" sz="3600" b="1" dirty="0"/>
+              <a:t>Summarization	</a:t>
+            </a:r>
+          </a:p>
+        </p:txBody>
+      </p:sp>
+    </p:spTree>
+    <p:extLst>
+      <p:ext uri="{BB962C8B-B14F-4D97-AF65-F5344CB8AC3E}">
+        <p14:creationId xmlns:p14="http://schemas.microsoft.com/office/powerpoint/2010/main" val="3345117839"/>
+      </p:ext>
+    </p:extLst>
+  </p:cSld>
+  <p:clrMapOvr>
+    <a:masterClrMapping/>
+  </p:clrMapOvr>
+</p:sld>
+</file>
+
+<file path=ppt/slides/slide12.xml><?xml version="1.0" encoding="utf-8"?>
+<p:sld xmlns:a="http://schemas.openxmlformats.org/drawingml/2006/main" xmlns:r="http://schemas.openxmlformats.org/officeDocument/2006/relationships" xmlns:p="http://schemas.openxmlformats.org/presentationml/2006/main">
+  <p:cSld>
+    <p:spTree>
+      <p:nvGrpSpPr>
+        <p:cNvPr id="1" name=""/>
+        <p:cNvGrpSpPr/>
+        <p:nvPr/>
+      </p:nvGrpSpPr>
+      <p:grpSpPr>
+        <a:xfrm>
+          <a:off x="0" y="0"/>
+          <a:ext cx="0" cy="0"/>
+          <a:chOff x="0" y="0"/>
+          <a:chExt cx="0" cy="0"/>
+        </a:xfrm>
+      </p:grpSpPr>
+      <p:sp>
+        <p:nvSpPr>
+          <p:cNvPr id="3" name="Content Placeholder 2"/>
+          <p:cNvSpPr>
+            <a:spLocks noGrp="1"/>
+          </p:cNvSpPr>
+          <p:nvPr>
+            <p:ph idx="1"/>
+          </p:nvPr>
+        </p:nvSpPr>
+        <p:spPr/>
+        <p:txBody>
+          <a:bodyPr>
+            <a:normAutofit/>
+          </a:bodyPr>
+          <a:lstStyle/>
+          <a:p>
+            <a:pPr marL="0" indent="0">
+              <a:buNone/>
+            </a:pPr>
+            <a:r>
+              <a:rPr lang="en-IN" sz="1400" dirty="0"/>
+              <a:t>Put down our investment recommendations to the CEO of Spark Funds </a:t>
+            </a:r>
+          </a:p>
+        </p:txBody>
+      </p:sp>
+      <p:sp>
+        <p:nvSpPr>
+          <p:cNvPr id="6" name="Title 1">
+            <a:extLst>
+              <a:ext uri="{FF2B5EF4-FFF2-40B4-BE49-F238E27FC236}">
+                <a16:creationId xmlns:a16="http://schemas.microsoft.com/office/drawing/2014/main" id="{BB26C5FD-2A30-48F0-AFAE-E61E67137864}"/>
+              </a:ext>
+            </a:extLst>
+          </p:cNvPr>
+          <p:cNvSpPr>
+            <a:spLocks noGrp="1"/>
+          </p:cNvSpPr>
+          <p:nvPr>
+            <p:ph type="title"/>
+          </p:nvPr>
+        </p:nvSpPr>
+        <p:spPr>
+          <a:xfrm>
+            <a:off x="404949" y="800336"/>
+            <a:ext cx="11168742" cy="856138"/>
+          </a:xfrm>
+        </p:spPr>
+        <p:txBody>
+          <a:bodyPr>
+            <a:normAutofit/>
+          </a:bodyPr>
+          <a:lstStyle/>
+          <a:p>
+            <a:r>
+              <a:rPr lang="en-IN" sz="3600" b="1" dirty="0"/>
+              <a:t>Conclusions	</a:t>
             </a:r>
           </a:p>
         </p:txBody>
@@ -3688,10 +3867,52 @@
           </a:bodyPr>
           <a:lstStyle/>
           <a:p>
-            <a:pPr marL="0" indent="0">
-              <a:buNone/>
-            </a:pPr>
-            <a:endParaRPr lang="en-IN" sz="1400" dirty="0"/>
+            <a:r>
+              <a:rPr lang="en-IN" dirty="0"/>
+              <a:t>Identify the best sectors, countries and suitable investment type for making investments</a:t>
+            </a:r>
+          </a:p>
+          <a:p>
+            <a:endParaRPr lang="en-IN" dirty="0"/>
+          </a:p>
+          <a:p>
+            <a:r>
+              <a:rPr lang="en-IN" dirty="0"/>
+              <a:t>Provide recommendations to the CEO of Spark Funds on the best sectors, countries and companies that Spark Funds should invest in</a:t>
+            </a:r>
+          </a:p>
+          <a:p>
+            <a:endParaRPr lang="en-IN" dirty="0"/>
+          </a:p>
+          <a:p>
+            <a:r>
+              <a:rPr lang="en-IN" dirty="0"/>
+              <a:t>Ensure that the recommendations are aligned with the following constraints</a:t>
+            </a:r>
+          </a:p>
+          <a:p>
+            <a:pPr lvl="1"/>
+            <a:r>
+              <a:rPr lang="en-IN" sz="2000" dirty="0"/>
+              <a:t>Investment round should be in the range of  $5 to $15 million</a:t>
+            </a:r>
+          </a:p>
+          <a:p>
+            <a:pPr lvl="1"/>
+            <a:r>
+              <a:rPr lang="en-IN" sz="2000" dirty="0"/>
+              <a:t>Companies should be in English-speaking countries</a:t>
+            </a:r>
+          </a:p>
+          <a:p>
+            <a:pPr lvl="1"/>
+            <a:r>
+              <a:rPr lang="en-IN" sz="2000" dirty="0"/>
+              <a:t>Investments should be in where others are also investing</a:t>
+            </a:r>
+          </a:p>
+          <a:p>
+            <a:endParaRPr lang="en-IN" sz="1800" dirty="0"/>
           </a:p>
         </p:txBody>
       </p:sp>
@@ -3707,21 +3928,19 @@
         </p:nvSpPr>
         <p:spPr>
           <a:xfrm>
-            <a:off x="1136469" y="640080"/>
-            <a:ext cx="9313817" cy="856138"/>
+            <a:off x="404949" y="800336"/>
+            <a:ext cx="11168742" cy="856138"/>
           </a:xfrm>
         </p:spPr>
         <p:txBody>
-          <a:bodyPr/>
-          <a:lstStyle/>
-          <a:p>
-            <a:r>
-              <a:rPr lang="en-IN" b="1" dirty="0"/>
-              <a:t> </a:t>
-            </a:r>
-            <a:r>
-              <a:rPr lang="en-IN" sz="2800" dirty="0"/>
-              <a:t>&lt;Abstract&gt;</a:t>
+          <a:bodyPr>
+            <a:normAutofit/>
+          </a:bodyPr>
+          <a:lstStyle/>
+          <a:p>
+            <a:r>
+              <a:rPr lang="en-IN" sz="3600" b="1" dirty="0"/>
+              <a:t>Key Objectives	</a:t>
             </a:r>
           </a:p>
         </p:txBody>
@@ -3758,33 +3977,6 @@
       </p:grpSpPr>
       <p:sp>
         <p:nvSpPr>
-          <p:cNvPr id="3" name="Content Placeholder 2"/>
-          <p:cNvSpPr>
-            <a:spLocks noGrp="1"/>
-          </p:cNvSpPr>
-          <p:nvPr>
-            <p:ph idx="1"/>
-          </p:nvPr>
-        </p:nvSpPr>
-        <p:spPr/>
-        <p:txBody>
-          <a:bodyPr>
-            <a:normAutofit/>
-          </a:bodyPr>
-          <a:lstStyle/>
-          <a:p>
-            <a:pPr marL="0" indent="0">
-              <a:buNone/>
-            </a:pPr>
-            <a:r>
-              <a:rPr lang="en-IN" sz="1800" dirty="0"/>
-              <a:t>Use flow chart</a:t>
-            </a:r>
-          </a:p>
-        </p:txBody>
-      </p:sp>
-      <p:sp>
-        <p:nvSpPr>
           <p:cNvPr id="5" name="Title 1"/>
           <p:cNvSpPr>
             <a:spLocks noGrp="1"/>
@@ -3804,16 +3996,691 @@
           <a:lstStyle/>
           <a:p>
             <a:r>
-              <a:rPr lang="en-IN" b="1" dirty="0"/>
-              <a:t> </a:t>
-            </a:r>
-            <a:r>
-              <a:rPr lang="en-IN" sz="2800" dirty="0"/>
-              <a:t>&lt;Problem solving methodology&gt;</a:t>
-            </a:r>
-          </a:p>
-        </p:txBody>
-      </p:sp>
+              <a:rPr lang="en-IN" sz="2800" b="1" dirty="0"/>
+              <a:t>Process Workflow</a:t>
+            </a:r>
+            <a:endParaRPr lang="en-IN" sz="2800" dirty="0"/>
+          </a:p>
+        </p:txBody>
+      </p:sp>
+      <p:sp>
+        <p:nvSpPr>
+          <p:cNvPr id="4" name="Rectangle: Rounded Corners 3">
+            <a:extLst>
+              <a:ext uri="{FF2B5EF4-FFF2-40B4-BE49-F238E27FC236}">
+                <a16:creationId xmlns:a16="http://schemas.microsoft.com/office/drawing/2014/main" id="{E699CFA2-ED1E-42B7-A259-764412F7379A}"/>
+              </a:ext>
+            </a:extLst>
+          </p:cNvPr>
+          <p:cNvSpPr/>
+          <p:nvPr/>
+        </p:nvSpPr>
+        <p:spPr>
+          <a:xfrm>
+            <a:off x="518474" y="1913641"/>
+            <a:ext cx="2705493" cy="1018095"/>
+          </a:xfrm>
+          <a:prstGeom prst="roundRect">
+            <a:avLst/>
+          </a:prstGeom>
+          <a:gradFill>
+            <a:gsLst>
+              <a:gs pos="0">
+                <a:schemeClr val="accent1">
+                  <a:lumMod val="5000"/>
+                  <a:lumOff val="95000"/>
+                </a:schemeClr>
+              </a:gs>
+              <a:gs pos="74000">
+                <a:schemeClr val="accent1">
+                  <a:lumMod val="45000"/>
+                  <a:lumOff val="55000"/>
+                </a:schemeClr>
+              </a:gs>
+              <a:gs pos="83000">
+                <a:schemeClr val="accent1">
+                  <a:lumMod val="45000"/>
+                  <a:lumOff val="55000"/>
+                </a:schemeClr>
+              </a:gs>
+              <a:gs pos="100000">
+                <a:schemeClr val="accent1">
+                  <a:lumMod val="30000"/>
+                  <a:lumOff val="70000"/>
+                </a:schemeClr>
+              </a:gs>
+            </a:gsLst>
+            <a:lin ang="5400000" scaled="1"/>
+          </a:gradFill>
+        </p:spPr>
+        <p:style>
+          <a:lnRef idx="2">
+            <a:schemeClr val="dk1"/>
+          </a:lnRef>
+          <a:fillRef idx="1">
+            <a:schemeClr val="lt1"/>
+          </a:fillRef>
+          <a:effectRef idx="0">
+            <a:schemeClr val="dk1"/>
+          </a:effectRef>
+          <a:fontRef idx="minor">
+            <a:schemeClr val="dk1"/>
+          </a:fontRef>
+        </p:style>
+        <p:txBody>
+          <a:bodyPr rtlCol="0" anchor="ctr"/>
+          <a:lstStyle/>
+          <a:p>
+            <a:pPr algn="ctr"/>
+            <a:r>
+              <a:rPr lang="en-US" dirty="0"/>
+              <a:t>Business Understanding</a:t>
+            </a:r>
+          </a:p>
+        </p:txBody>
+      </p:sp>
+      <p:sp>
+        <p:nvSpPr>
+          <p:cNvPr id="6" name="Rectangle: Rounded Corners 5">
+            <a:extLst>
+              <a:ext uri="{FF2B5EF4-FFF2-40B4-BE49-F238E27FC236}">
+                <a16:creationId xmlns:a16="http://schemas.microsoft.com/office/drawing/2014/main" id="{C375B7C8-7191-4A87-B756-27EFABDA21D9}"/>
+              </a:ext>
+            </a:extLst>
+          </p:cNvPr>
+          <p:cNvSpPr/>
+          <p:nvPr/>
+        </p:nvSpPr>
+        <p:spPr>
+          <a:xfrm>
+            <a:off x="4592425" y="1913640"/>
+            <a:ext cx="2705493" cy="1018095"/>
+          </a:xfrm>
+          <a:prstGeom prst="roundRect">
+            <a:avLst/>
+          </a:prstGeom>
+          <a:gradFill>
+            <a:gsLst>
+              <a:gs pos="0">
+                <a:schemeClr val="accent1">
+                  <a:lumMod val="5000"/>
+                  <a:lumOff val="95000"/>
+                </a:schemeClr>
+              </a:gs>
+              <a:gs pos="74000">
+                <a:schemeClr val="accent1">
+                  <a:lumMod val="45000"/>
+                  <a:lumOff val="55000"/>
+                </a:schemeClr>
+              </a:gs>
+              <a:gs pos="83000">
+                <a:schemeClr val="accent1">
+                  <a:lumMod val="45000"/>
+                  <a:lumOff val="55000"/>
+                </a:schemeClr>
+              </a:gs>
+              <a:gs pos="100000">
+                <a:schemeClr val="accent1">
+                  <a:lumMod val="30000"/>
+                  <a:lumOff val="70000"/>
+                </a:schemeClr>
+              </a:gs>
+            </a:gsLst>
+            <a:lin ang="5400000" scaled="1"/>
+          </a:gradFill>
+        </p:spPr>
+        <p:style>
+          <a:lnRef idx="2">
+            <a:schemeClr val="accent6"/>
+          </a:lnRef>
+          <a:fillRef idx="1">
+            <a:schemeClr val="lt1"/>
+          </a:fillRef>
+          <a:effectRef idx="0">
+            <a:schemeClr val="accent6"/>
+          </a:effectRef>
+          <a:fontRef idx="minor">
+            <a:schemeClr val="dk1"/>
+          </a:fontRef>
+        </p:style>
+        <p:txBody>
+          <a:bodyPr rtlCol="0" anchor="ctr"/>
+          <a:lstStyle/>
+          <a:p>
+            <a:pPr algn="ctr"/>
+            <a:r>
+              <a:rPr lang="en-US" dirty="0"/>
+              <a:t>Data Understanding</a:t>
+            </a:r>
+          </a:p>
+        </p:txBody>
+      </p:sp>
+      <p:cxnSp>
+        <p:nvCxnSpPr>
+          <p:cNvPr id="8" name="Straight Arrow Connector 7">
+            <a:extLst>
+              <a:ext uri="{FF2B5EF4-FFF2-40B4-BE49-F238E27FC236}">
+                <a16:creationId xmlns:a16="http://schemas.microsoft.com/office/drawing/2014/main" id="{139ECC65-2216-4FA9-913D-E28F6418516C}"/>
+              </a:ext>
+            </a:extLst>
+          </p:cNvPr>
+          <p:cNvCxnSpPr>
+            <a:stCxn id="4" idx="3"/>
+            <a:endCxn id="6" idx="1"/>
+          </p:cNvCxnSpPr>
+          <p:nvPr/>
+        </p:nvCxnSpPr>
+        <p:spPr>
+          <a:xfrm flipV="1">
+            <a:off x="3223967" y="2422688"/>
+            <a:ext cx="1368458" cy="1"/>
+          </a:xfrm>
+          <a:prstGeom prst="straightConnector1">
+            <a:avLst/>
+          </a:prstGeom>
+          <a:ln w="38100">
+            <a:solidFill>
+              <a:schemeClr val="tx1"/>
+            </a:solidFill>
+            <a:tailEnd type="stealth" w="lg" len="lg"/>
+          </a:ln>
+        </p:spPr>
+        <p:style>
+          <a:lnRef idx="1">
+            <a:schemeClr val="accent1"/>
+          </a:lnRef>
+          <a:fillRef idx="0">
+            <a:schemeClr val="accent1"/>
+          </a:fillRef>
+          <a:effectRef idx="0">
+            <a:schemeClr val="accent1"/>
+          </a:effectRef>
+          <a:fontRef idx="minor">
+            <a:schemeClr val="tx1"/>
+          </a:fontRef>
+        </p:style>
+      </p:cxnSp>
+      <p:sp>
+        <p:nvSpPr>
+          <p:cNvPr id="9" name="Rectangle: Rounded Corners 8">
+            <a:extLst>
+              <a:ext uri="{FF2B5EF4-FFF2-40B4-BE49-F238E27FC236}">
+                <a16:creationId xmlns:a16="http://schemas.microsoft.com/office/drawing/2014/main" id="{CA115E60-AEB0-48AB-B337-E1E4AB310384}"/>
+              </a:ext>
+            </a:extLst>
+          </p:cNvPr>
+          <p:cNvSpPr/>
+          <p:nvPr/>
+        </p:nvSpPr>
+        <p:spPr>
+          <a:xfrm>
+            <a:off x="8666376" y="1913639"/>
+            <a:ext cx="2705493" cy="1018095"/>
+          </a:xfrm>
+          <a:prstGeom prst="roundRect">
+            <a:avLst/>
+          </a:prstGeom>
+          <a:gradFill>
+            <a:gsLst>
+              <a:gs pos="0">
+                <a:schemeClr val="accent1">
+                  <a:lumMod val="5000"/>
+                  <a:lumOff val="95000"/>
+                </a:schemeClr>
+              </a:gs>
+              <a:gs pos="74000">
+                <a:schemeClr val="accent1">
+                  <a:lumMod val="45000"/>
+                  <a:lumOff val="55000"/>
+                </a:schemeClr>
+              </a:gs>
+              <a:gs pos="83000">
+                <a:schemeClr val="accent1">
+                  <a:lumMod val="45000"/>
+                  <a:lumOff val="55000"/>
+                </a:schemeClr>
+              </a:gs>
+              <a:gs pos="100000">
+                <a:schemeClr val="accent1">
+                  <a:lumMod val="30000"/>
+                  <a:lumOff val="70000"/>
+                </a:schemeClr>
+              </a:gs>
+            </a:gsLst>
+            <a:lin ang="5400000" scaled="1"/>
+          </a:gradFill>
+        </p:spPr>
+        <p:style>
+          <a:lnRef idx="2">
+            <a:schemeClr val="accent6"/>
+          </a:lnRef>
+          <a:fillRef idx="1">
+            <a:schemeClr val="lt1"/>
+          </a:fillRef>
+          <a:effectRef idx="0">
+            <a:schemeClr val="accent6"/>
+          </a:effectRef>
+          <a:fontRef idx="minor">
+            <a:schemeClr val="dk1"/>
+          </a:fontRef>
+        </p:style>
+        <p:txBody>
+          <a:bodyPr rtlCol="0" anchor="ctr"/>
+          <a:lstStyle/>
+          <a:p>
+            <a:pPr algn="ctr"/>
+            <a:r>
+              <a:rPr lang="en-US" dirty="0"/>
+              <a:t>Data Preparation</a:t>
+            </a:r>
+          </a:p>
+        </p:txBody>
+      </p:sp>
+      <p:cxnSp>
+        <p:nvCxnSpPr>
+          <p:cNvPr id="10" name="Straight Arrow Connector 9">
+            <a:extLst>
+              <a:ext uri="{FF2B5EF4-FFF2-40B4-BE49-F238E27FC236}">
+                <a16:creationId xmlns:a16="http://schemas.microsoft.com/office/drawing/2014/main" id="{CD2B2FF3-DD92-4550-A987-E4774DC55861}"/>
+              </a:ext>
+            </a:extLst>
+          </p:cNvPr>
+          <p:cNvCxnSpPr/>
+          <p:nvPr/>
+        </p:nvCxnSpPr>
+        <p:spPr>
+          <a:xfrm flipV="1">
+            <a:off x="7297918" y="2422685"/>
+            <a:ext cx="1368458" cy="1"/>
+          </a:xfrm>
+          <a:prstGeom prst="straightConnector1">
+            <a:avLst/>
+          </a:prstGeom>
+          <a:ln w="38100">
+            <a:solidFill>
+              <a:schemeClr val="tx1"/>
+            </a:solidFill>
+            <a:tailEnd type="stealth" w="lg" len="lg"/>
+          </a:ln>
+        </p:spPr>
+        <p:style>
+          <a:lnRef idx="1">
+            <a:schemeClr val="accent1"/>
+          </a:lnRef>
+          <a:fillRef idx="0">
+            <a:schemeClr val="accent1"/>
+          </a:fillRef>
+          <a:effectRef idx="0">
+            <a:schemeClr val="accent1"/>
+          </a:effectRef>
+          <a:fontRef idx="minor">
+            <a:schemeClr val="tx1"/>
+          </a:fontRef>
+        </p:style>
+      </p:cxnSp>
+      <p:sp>
+        <p:nvSpPr>
+          <p:cNvPr id="11" name="Rectangle: Rounded Corners 10">
+            <a:extLst>
+              <a:ext uri="{FF2B5EF4-FFF2-40B4-BE49-F238E27FC236}">
+                <a16:creationId xmlns:a16="http://schemas.microsoft.com/office/drawing/2014/main" id="{2CEBC9DA-DEA4-43B1-88B3-87C1BBA37FC6}"/>
+              </a:ext>
+            </a:extLst>
+          </p:cNvPr>
+          <p:cNvSpPr/>
+          <p:nvPr/>
+        </p:nvSpPr>
+        <p:spPr>
+          <a:xfrm>
+            <a:off x="8686696" y="4352039"/>
+            <a:ext cx="2705493" cy="1018095"/>
+          </a:xfrm>
+          <a:prstGeom prst="roundRect">
+            <a:avLst/>
+          </a:prstGeom>
+          <a:gradFill>
+            <a:gsLst>
+              <a:gs pos="0">
+                <a:schemeClr val="accent1">
+                  <a:lumMod val="5000"/>
+                  <a:lumOff val="95000"/>
+                </a:schemeClr>
+              </a:gs>
+              <a:gs pos="74000">
+                <a:schemeClr val="accent1">
+                  <a:lumMod val="45000"/>
+                  <a:lumOff val="55000"/>
+                </a:schemeClr>
+              </a:gs>
+              <a:gs pos="83000">
+                <a:schemeClr val="accent1">
+                  <a:lumMod val="45000"/>
+                  <a:lumOff val="55000"/>
+                </a:schemeClr>
+              </a:gs>
+              <a:gs pos="100000">
+                <a:schemeClr val="accent1">
+                  <a:lumMod val="30000"/>
+                  <a:lumOff val="70000"/>
+                </a:schemeClr>
+              </a:gs>
+            </a:gsLst>
+            <a:lin ang="5400000" scaled="1"/>
+          </a:gradFill>
+        </p:spPr>
+        <p:style>
+          <a:lnRef idx="2">
+            <a:schemeClr val="accent6"/>
+          </a:lnRef>
+          <a:fillRef idx="1">
+            <a:schemeClr val="lt1"/>
+          </a:fillRef>
+          <a:effectRef idx="0">
+            <a:schemeClr val="accent6"/>
+          </a:effectRef>
+          <a:fontRef idx="minor">
+            <a:schemeClr val="dk1"/>
+          </a:fontRef>
+        </p:style>
+        <p:txBody>
+          <a:bodyPr rtlCol="0" anchor="ctr"/>
+          <a:lstStyle/>
+          <a:p>
+            <a:pPr algn="ctr"/>
+            <a:r>
+              <a:rPr lang="en-US" dirty="0"/>
+              <a:t>Data Analysis</a:t>
+            </a:r>
+          </a:p>
+        </p:txBody>
+      </p:sp>
+      <p:cxnSp>
+        <p:nvCxnSpPr>
+          <p:cNvPr id="12" name="Straight Arrow Connector 11">
+            <a:extLst>
+              <a:ext uri="{FF2B5EF4-FFF2-40B4-BE49-F238E27FC236}">
+                <a16:creationId xmlns:a16="http://schemas.microsoft.com/office/drawing/2014/main" id="{143FBABE-158E-4671-8A71-79CAF22F4AC4}"/>
+              </a:ext>
+            </a:extLst>
+          </p:cNvPr>
+          <p:cNvCxnSpPr>
+            <a:cxnSpLocks/>
+            <a:stCxn id="9" idx="2"/>
+            <a:endCxn id="11" idx="0"/>
+          </p:cNvCxnSpPr>
+          <p:nvPr/>
+        </p:nvCxnSpPr>
+        <p:spPr>
+          <a:xfrm>
+            <a:off x="10019123" y="2931734"/>
+            <a:ext cx="20320" cy="1420305"/>
+          </a:xfrm>
+          <a:prstGeom prst="straightConnector1">
+            <a:avLst/>
+          </a:prstGeom>
+          <a:ln w="38100">
+            <a:solidFill>
+              <a:schemeClr val="tx1"/>
+            </a:solidFill>
+            <a:tailEnd type="stealth" w="lg" len="lg"/>
+          </a:ln>
+        </p:spPr>
+        <p:style>
+          <a:lnRef idx="1">
+            <a:schemeClr val="accent1"/>
+          </a:lnRef>
+          <a:fillRef idx="0">
+            <a:schemeClr val="accent1"/>
+          </a:fillRef>
+          <a:effectRef idx="0">
+            <a:schemeClr val="accent1"/>
+          </a:effectRef>
+          <a:fontRef idx="minor">
+            <a:schemeClr val="tx1"/>
+          </a:fontRef>
+        </p:style>
+      </p:cxnSp>
+      <p:sp>
+        <p:nvSpPr>
+          <p:cNvPr id="19" name="Rectangle: Rounded Corners 18">
+            <a:extLst>
+              <a:ext uri="{FF2B5EF4-FFF2-40B4-BE49-F238E27FC236}">
+                <a16:creationId xmlns:a16="http://schemas.microsoft.com/office/drawing/2014/main" id="{C23DBB3B-BAA3-402B-8CE9-9E31EA9D41A4}"/>
+              </a:ext>
+            </a:extLst>
+          </p:cNvPr>
+          <p:cNvSpPr/>
+          <p:nvPr/>
+        </p:nvSpPr>
+        <p:spPr>
+          <a:xfrm>
+            <a:off x="4584569" y="4352038"/>
+            <a:ext cx="2705493" cy="1018095"/>
+          </a:xfrm>
+          <a:prstGeom prst="roundRect">
+            <a:avLst/>
+          </a:prstGeom>
+          <a:gradFill>
+            <a:gsLst>
+              <a:gs pos="0">
+                <a:schemeClr val="accent1">
+                  <a:lumMod val="5000"/>
+                  <a:lumOff val="95000"/>
+                </a:schemeClr>
+              </a:gs>
+              <a:gs pos="74000">
+                <a:schemeClr val="accent1">
+                  <a:lumMod val="45000"/>
+                  <a:lumOff val="55000"/>
+                </a:schemeClr>
+              </a:gs>
+              <a:gs pos="83000">
+                <a:schemeClr val="accent1">
+                  <a:lumMod val="45000"/>
+                  <a:lumOff val="55000"/>
+                </a:schemeClr>
+              </a:gs>
+              <a:gs pos="100000">
+                <a:schemeClr val="accent1">
+                  <a:lumMod val="30000"/>
+                  <a:lumOff val="70000"/>
+                </a:schemeClr>
+              </a:gs>
+            </a:gsLst>
+            <a:lin ang="5400000" scaled="1"/>
+          </a:gradFill>
+        </p:spPr>
+        <p:style>
+          <a:lnRef idx="2">
+            <a:schemeClr val="accent6"/>
+          </a:lnRef>
+          <a:fillRef idx="1">
+            <a:schemeClr val="lt1"/>
+          </a:fillRef>
+          <a:effectRef idx="0">
+            <a:schemeClr val="accent6"/>
+          </a:effectRef>
+          <a:fontRef idx="minor">
+            <a:schemeClr val="dk1"/>
+          </a:fontRef>
+        </p:style>
+        <p:txBody>
+          <a:bodyPr rtlCol="0" anchor="ctr"/>
+          <a:lstStyle/>
+          <a:p>
+            <a:pPr algn="ctr"/>
+            <a:r>
+              <a:rPr lang="en-US" dirty="0"/>
+              <a:t>Summarization</a:t>
+            </a:r>
+          </a:p>
+        </p:txBody>
+      </p:sp>
+      <p:cxnSp>
+        <p:nvCxnSpPr>
+          <p:cNvPr id="20" name="Straight Arrow Connector 19">
+            <a:extLst>
+              <a:ext uri="{FF2B5EF4-FFF2-40B4-BE49-F238E27FC236}">
+                <a16:creationId xmlns:a16="http://schemas.microsoft.com/office/drawing/2014/main" id="{AC746399-5716-441E-8670-AF49D8A7CAB2}"/>
+              </a:ext>
+            </a:extLst>
+          </p:cNvPr>
+          <p:cNvCxnSpPr>
+            <a:cxnSpLocks/>
+            <a:stCxn id="11" idx="1"/>
+          </p:cNvCxnSpPr>
+          <p:nvPr/>
+        </p:nvCxnSpPr>
+        <p:spPr>
+          <a:xfrm flipH="1">
+            <a:off x="7297918" y="4861087"/>
+            <a:ext cx="1388778" cy="0"/>
+          </a:xfrm>
+          <a:prstGeom prst="straightConnector1">
+            <a:avLst/>
+          </a:prstGeom>
+          <a:ln w="38100">
+            <a:solidFill>
+              <a:schemeClr val="tx1"/>
+            </a:solidFill>
+            <a:tailEnd type="stealth" w="lg" len="lg"/>
+          </a:ln>
+        </p:spPr>
+        <p:style>
+          <a:lnRef idx="1">
+            <a:schemeClr val="accent1"/>
+          </a:lnRef>
+          <a:fillRef idx="0">
+            <a:schemeClr val="accent1"/>
+          </a:fillRef>
+          <a:effectRef idx="0">
+            <a:schemeClr val="accent1"/>
+          </a:effectRef>
+          <a:fontRef idx="minor">
+            <a:schemeClr val="tx1"/>
+          </a:fontRef>
+        </p:style>
+      </p:cxnSp>
+      <p:sp>
+        <p:nvSpPr>
+          <p:cNvPr id="26" name="Rectangle: Rounded Corners 25">
+            <a:extLst>
+              <a:ext uri="{FF2B5EF4-FFF2-40B4-BE49-F238E27FC236}">
+                <a16:creationId xmlns:a16="http://schemas.microsoft.com/office/drawing/2014/main" id="{C81FBEF1-794B-4866-B8B9-8FEE240457E6}"/>
+              </a:ext>
+            </a:extLst>
+          </p:cNvPr>
+          <p:cNvSpPr/>
+          <p:nvPr/>
+        </p:nvSpPr>
+        <p:spPr>
+          <a:xfrm>
+            <a:off x="502761" y="4352038"/>
+            <a:ext cx="2705493" cy="1018095"/>
+          </a:xfrm>
+          <a:prstGeom prst="roundRect">
+            <a:avLst/>
+          </a:prstGeom>
+          <a:gradFill>
+            <a:gsLst>
+              <a:gs pos="0">
+                <a:schemeClr val="accent1">
+                  <a:lumMod val="5000"/>
+                  <a:lumOff val="95000"/>
+                </a:schemeClr>
+              </a:gs>
+              <a:gs pos="74000">
+                <a:schemeClr val="accent1">
+                  <a:lumMod val="45000"/>
+                  <a:lumOff val="55000"/>
+                </a:schemeClr>
+              </a:gs>
+              <a:gs pos="83000">
+                <a:schemeClr val="accent1">
+                  <a:lumMod val="45000"/>
+                  <a:lumOff val="55000"/>
+                </a:schemeClr>
+              </a:gs>
+              <a:gs pos="100000">
+                <a:schemeClr val="accent1">
+                  <a:lumMod val="30000"/>
+                  <a:lumOff val="70000"/>
+                </a:schemeClr>
+              </a:gs>
+            </a:gsLst>
+            <a:lin ang="5400000" scaled="1"/>
+          </a:gradFill>
+        </p:spPr>
+        <p:style>
+          <a:lnRef idx="2">
+            <a:schemeClr val="accent6"/>
+          </a:lnRef>
+          <a:fillRef idx="1">
+            <a:schemeClr val="lt1"/>
+          </a:fillRef>
+          <a:effectRef idx="0">
+            <a:schemeClr val="accent6"/>
+          </a:effectRef>
+          <a:fontRef idx="minor">
+            <a:schemeClr val="dk1"/>
+          </a:fontRef>
+        </p:style>
+        <p:txBody>
+          <a:bodyPr rtlCol="0" anchor="ctr"/>
+          <a:lstStyle/>
+          <a:p>
+            <a:pPr algn="ctr"/>
+            <a:r>
+              <a:rPr lang="en-US" dirty="0"/>
+              <a:t>Conclusions</a:t>
+            </a:r>
+          </a:p>
+        </p:txBody>
+      </p:sp>
+      <p:cxnSp>
+        <p:nvCxnSpPr>
+          <p:cNvPr id="27" name="Straight Arrow Connector 26">
+            <a:extLst>
+              <a:ext uri="{FF2B5EF4-FFF2-40B4-BE49-F238E27FC236}">
+                <a16:creationId xmlns:a16="http://schemas.microsoft.com/office/drawing/2014/main" id="{363DD716-BB57-4C4F-82E7-FF363AEADDAC}"/>
+              </a:ext>
+            </a:extLst>
+          </p:cNvPr>
+          <p:cNvCxnSpPr>
+            <a:cxnSpLocks/>
+          </p:cNvCxnSpPr>
+          <p:nvPr/>
+        </p:nvCxnSpPr>
+        <p:spPr>
+          <a:xfrm flipH="1">
+            <a:off x="3223967" y="4845372"/>
+            <a:ext cx="1388778" cy="0"/>
+          </a:xfrm>
+          <a:prstGeom prst="straightConnector1">
+            <a:avLst/>
+          </a:prstGeom>
+          <a:ln w="38100">
+            <a:solidFill>
+              <a:schemeClr val="tx1"/>
+            </a:solidFill>
+            <a:tailEnd type="stealth" w="lg" len="lg"/>
+          </a:ln>
+        </p:spPr>
+        <p:style>
+          <a:lnRef idx="1">
+            <a:schemeClr val="accent1"/>
+          </a:lnRef>
+          <a:fillRef idx="0">
+            <a:schemeClr val="accent1"/>
+          </a:fillRef>
+          <a:effectRef idx="0">
+            <a:schemeClr val="accent1"/>
+          </a:effectRef>
+          <a:fontRef idx="minor">
+            <a:schemeClr val="tx1"/>
+          </a:fontRef>
+        </p:style>
+      </p:cxnSp>
     </p:spTree>
     <p:extLst>
       <p:ext uri="{BB962C8B-B14F-4D97-AF65-F5344CB8AC3E}">
@@ -3846,7 +4713,99 @@
       </p:grpSpPr>
       <p:sp>
         <p:nvSpPr>
-          <p:cNvPr id="2" name="Title 1"/>
+          <p:cNvPr id="3" name="Content Placeholder 2"/>
+          <p:cNvSpPr>
+            <a:spLocks noGrp="1"/>
+          </p:cNvSpPr>
+          <p:nvPr>
+            <p:ph idx="1"/>
+          </p:nvPr>
+        </p:nvSpPr>
+        <p:spPr>
+          <a:xfrm>
+            <a:off x="404949" y="1854926"/>
+            <a:ext cx="11168742" cy="4698274"/>
+          </a:xfrm>
+        </p:spPr>
+        <p:txBody>
+          <a:bodyPr>
+            <a:normAutofit fontScale="92500" lnSpcReduction="10000"/>
+          </a:bodyPr>
+          <a:lstStyle/>
+          <a:p>
+            <a:pPr marL="0" indent="0">
+              <a:buNone/>
+            </a:pPr>
+            <a:r>
+              <a:rPr lang="en-IN" sz="2400" b="1" dirty="0"/>
+              <a:t>Business Objective</a:t>
+            </a:r>
+          </a:p>
+          <a:p>
+            <a:r>
+              <a:rPr lang="en-IN" sz="2400" dirty="0"/>
+              <a:t>Provide insights to the CEO of Spark Funds on the current global trends in investments across sectors</a:t>
+            </a:r>
+          </a:p>
+          <a:p>
+            <a:endParaRPr lang="en-IN" sz="2400" dirty="0"/>
+          </a:p>
+          <a:p>
+            <a:r>
+              <a:rPr lang="en-IN" sz="2400" dirty="0"/>
+              <a:t>Provide recommendations to the CEO on the sectors, countries and companies that are best suited for making investments</a:t>
+            </a:r>
+          </a:p>
+          <a:p>
+            <a:pPr marL="0" indent="0">
+              <a:buNone/>
+            </a:pPr>
+            <a:endParaRPr lang="en-IN" sz="2400" dirty="0"/>
+          </a:p>
+          <a:p>
+            <a:r>
+              <a:rPr lang="en-IN" sz="2400" dirty="0"/>
+              <a:t>Recommendations should be aligned with the following constraints</a:t>
+            </a:r>
+          </a:p>
+          <a:p>
+            <a:pPr lvl="1"/>
+            <a:r>
+              <a:rPr lang="en-IN" sz="2000" dirty="0"/>
+              <a:t>Investments should be in the range of $5 to $15 million per round</a:t>
+            </a:r>
+          </a:p>
+          <a:p>
+            <a:pPr lvl="1"/>
+            <a:r>
+              <a:rPr lang="en-IN" sz="2000" dirty="0"/>
+              <a:t>Investments should be only in English-speaking countries</a:t>
+            </a:r>
+          </a:p>
+          <a:p>
+            <a:pPr lvl="1"/>
+            <a:endParaRPr lang="en-IN" sz="2000" dirty="0"/>
+          </a:p>
+          <a:p>
+            <a:r>
+              <a:rPr lang="en-IN" sz="2400" dirty="0"/>
+              <a:t>Recommendations should be aligned with Spark Funds strategy of investing where others are also investing</a:t>
+            </a:r>
+          </a:p>
+          <a:p>
+            <a:endParaRPr lang="en-IN" sz="2000" dirty="0"/>
+          </a:p>
+        </p:txBody>
+      </p:sp>
+      <p:sp>
+        <p:nvSpPr>
+          <p:cNvPr id="6" name="Title 1">
+            <a:extLst>
+              <a:ext uri="{FF2B5EF4-FFF2-40B4-BE49-F238E27FC236}">
+                <a16:creationId xmlns:a16="http://schemas.microsoft.com/office/drawing/2014/main" id="{C9ED24FB-F1DF-43A2-A28A-E1B9714DF31A}"/>
+              </a:ext>
+            </a:extLst>
+          </p:cNvPr>
           <p:cNvSpPr>
             <a:spLocks noGrp="1"/>
           </p:cNvSpPr>
@@ -3854,43 +4813,22 @@
             <p:ph type="title"/>
           </p:nvPr>
         </p:nvSpPr>
-        <p:spPr/>
-        <p:txBody>
-          <a:bodyPr/>
-          <a:lstStyle/>
-          <a:p>
-            <a:r>
-              <a:rPr lang="en-IN" b="1" dirty="0"/>
-              <a:t> </a:t>
-            </a:r>
-            <a:r>
-              <a:rPr lang="en-IN" sz="2800" dirty="0"/>
-              <a:t>&lt;Analysis&gt;</a:t>
-            </a:r>
-          </a:p>
-        </p:txBody>
-      </p:sp>
-      <p:sp>
-        <p:nvSpPr>
-          <p:cNvPr id="3" name="Content Placeholder 2"/>
-          <p:cNvSpPr>
-            <a:spLocks noGrp="1"/>
-          </p:cNvSpPr>
-          <p:nvPr>
-            <p:ph idx="1"/>
-          </p:nvPr>
-        </p:nvSpPr>
-        <p:spPr/>
+        <p:spPr>
+          <a:xfrm>
+            <a:off x="404949" y="800336"/>
+            <a:ext cx="11168742" cy="856138"/>
+          </a:xfrm>
+        </p:spPr>
         <p:txBody>
           <a:bodyPr>
             <a:normAutofit/>
           </a:bodyPr>
           <a:lstStyle/>
           <a:p>
-            <a:pPr marL="0" indent="0">
-              <a:buNone/>
-            </a:pPr>
-            <a:endParaRPr lang="en-IN" sz="1400" dirty="0"/>
+            <a:r>
+              <a:rPr lang="en-IN" sz="3600" b="1" dirty="0"/>
+              <a:t>Business Understanding	</a:t>
+            </a:r>
           </a:p>
         </p:txBody>
       </p:sp>
@@ -3926,7 +4864,169 @@
       </p:grpSpPr>
       <p:sp>
         <p:nvSpPr>
-          <p:cNvPr id="2" name="Title 1"/>
+          <p:cNvPr id="3" name="Content Placeholder 2"/>
+          <p:cNvSpPr>
+            <a:spLocks noGrp="1"/>
+          </p:cNvSpPr>
+          <p:nvPr>
+            <p:ph idx="1"/>
+          </p:nvPr>
+        </p:nvSpPr>
+        <p:spPr>
+          <a:xfrm>
+            <a:off x="404949" y="1377126"/>
+            <a:ext cx="11168742" cy="5303126"/>
+          </a:xfrm>
+        </p:spPr>
+        <p:txBody>
+          <a:bodyPr>
+            <a:normAutofit lnSpcReduction="10000"/>
+          </a:bodyPr>
+          <a:lstStyle/>
+          <a:p>
+            <a:pPr marL="0" indent="0">
+              <a:buNone/>
+            </a:pPr>
+            <a:r>
+              <a:rPr lang="en-IN" sz="1600" b="1" dirty="0"/>
+              <a:t>Data Sources</a:t>
+            </a:r>
+          </a:p>
+          <a:p>
+            <a:r>
+              <a:rPr lang="en-IN" sz="1600" b="1" dirty="0"/>
+              <a:t>companies</a:t>
+            </a:r>
+            <a:r>
+              <a:rPr lang="en-IN" sz="1600" dirty="0"/>
+              <a:t> - Companies data extracted from crunchbase.com</a:t>
+            </a:r>
+          </a:p>
+          <a:p>
+            <a:r>
+              <a:rPr lang="en-IN" sz="1600" b="1" dirty="0"/>
+              <a:t>rounds2</a:t>
+            </a:r>
+            <a:r>
+              <a:rPr lang="en-IN" sz="1600" dirty="0"/>
+              <a:t> - Details of funding rounds for companies for crunchbase.com</a:t>
+            </a:r>
+          </a:p>
+          <a:p>
+            <a:r>
+              <a:rPr lang="en-IN" sz="1600" b="1" dirty="0"/>
+              <a:t>mapping</a:t>
+            </a:r>
+            <a:r>
+              <a:rPr lang="en-IN" sz="1600" dirty="0"/>
+              <a:t> - Sector classification that maps the various investment categories into 8 broad sectors</a:t>
+            </a:r>
+          </a:p>
+          <a:p>
+            <a:pPr marL="0" indent="0">
+              <a:buNone/>
+            </a:pPr>
+            <a:endParaRPr lang="en-IN" sz="1600" dirty="0"/>
+          </a:p>
+          <a:p>
+            <a:pPr marL="0" indent="0">
+              <a:buNone/>
+            </a:pPr>
+            <a:r>
+              <a:rPr lang="en-IN" sz="1600" b="1" dirty="0"/>
+              <a:t>High level view of data</a:t>
+            </a:r>
+          </a:p>
+          <a:p>
+            <a:r>
+              <a:rPr lang="en-IN" sz="1600" dirty="0"/>
+              <a:t>No. of unique companies in rounds2: 66368</a:t>
+            </a:r>
+          </a:p>
+          <a:p>
+            <a:r>
+              <a:rPr lang="en-IN" sz="1600" dirty="0"/>
+              <a:t>No. of unique companies in companies: 66368</a:t>
+            </a:r>
+          </a:p>
+          <a:p>
+            <a:r>
+              <a:rPr lang="en-IN" sz="1600" dirty="0"/>
+              <a:t>Unique key for each company in companies data : permalink</a:t>
+            </a:r>
+          </a:p>
+          <a:p>
+            <a:r>
+              <a:rPr lang="en-IN" sz="1600" dirty="0"/>
+              <a:t>rounds2 and companies do not contain any unmatched companies</a:t>
+            </a:r>
+          </a:p>
+          <a:p>
+            <a:r>
+              <a:rPr lang="en-IN" sz="1600" dirty="0"/>
+              <a:t>Merged data (round2 + companies) contains 114949 observations</a:t>
+            </a:r>
+          </a:p>
+          <a:p>
+            <a:pPr marL="0" indent="0">
+              <a:buNone/>
+            </a:pPr>
+            <a:endParaRPr lang="en-IN" sz="1600" dirty="0"/>
+          </a:p>
+          <a:p>
+            <a:pPr marL="0" indent="0">
+              <a:buNone/>
+            </a:pPr>
+            <a:r>
+              <a:rPr lang="en-IN" sz="1600" b="1" dirty="0"/>
+              <a:t>Data Quality</a:t>
+            </a:r>
+          </a:p>
+          <a:p>
+            <a:r>
+              <a:rPr lang="en-IN" sz="1600" dirty="0"/>
+              <a:t>Encoding issues exist in permalink column of companies data source and </a:t>
+            </a:r>
+            <a:r>
+              <a:rPr lang="en-IN" sz="1600" dirty="0" err="1"/>
+              <a:t>company_permalink</a:t>
+            </a:r>
+            <a:r>
+              <a:rPr lang="en-IN" sz="1600" dirty="0"/>
+              <a:t> column of rounds2 data source</a:t>
+            </a:r>
+          </a:p>
+          <a:p>
+            <a:r>
+              <a:rPr lang="en-IN" sz="1600" dirty="0"/>
+              <a:t>Few categories in mapping data source had 0 instead of the string ‘</a:t>
+            </a:r>
+            <a:r>
+              <a:rPr lang="en-IN" sz="1600" dirty="0" err="1"/>
+              <a:t>na</a:t>
+            </a:r>
+            <a:r>
+              <a:rPr lang="en-IN" sz="1600" dirty="0"/>
+              <a:t>’</a:t>
+            </a:r>
+          </a:p>
+          <a:p>
+            <a:r>
+              <a:rPr lang="en-IN" sz="1600" dirty="0"/>
+              <a:t>Some categories in the companies data source were not there in the mapping data source</a:t>
+            </a:r>
+          </a:p>
+        </p:txBody>
+      </p:sp>
+      <p:sp>
+        <p:nvSpPr>
+          <p:cNvPr id="6" name="Title 1">
+            <a:extLst>
+              <a:ext uri="{FF2B5EF4-FFF2-40B4-BE49-F238E27FC236}">
+                <a16:creationId xmlns:a16="http://schemas.microsoft.com/office/drawing/2014/main" id="{C9ED24FB-F1DF-43A2-A28A-E1B9714DF31A}"/>
+              </a:ext>
+            </a:extLst>
+          </p:cNvPr>
           <p:cNvSpPr>
             <a:spLocks noGrp="1"/>
           </p:cNvSpPr>
@@ -3934,50 +5034,37 @@
             <p:ph type="title"/>
           </p:nvPr>
         </p:nvSpPr>
-        <p:spPr/>
-        <p:txBody>
-          <a:bodyPr/>
-          <a:lstStyle/>
-          <a:p>
-            <a:r>
-              <a:rPr lang="en-IN" b="1" dirty="0"/>
-              <a:t> </a:t>
-            </a:r>
-            <a:r>
-              <a:rPr lang="en-IN" sz="2800" dirty="0"/>
-              <a:t>&lt;Analysis&gt;</a:t>
-            </a:r>
-          </a:p>
-        </p:txBody>
-      </p:sp>
-      <p:sp>
-        <p:nvSpPr>
-          <p:cNvPr id="3" name="Content Placeholder 2"/>
-          <p:cNvSpPr>
-            <a:spLocks noGrp="1"/>
-          </p:cNvSpPr>
-          <p:nvPr>
-            <p:ph idx="1"/>
-          </p:nvPr>
-        </p:nvSpPr>
-        <p:spPr/>
+        <p:spPr>
+          <a:xfrm>
+            <a:off x="404949" y="708162"/>
+            <a:ext cx="11168742" cy="668964"/>
+          </a:xfrm>
+        </p:spPr>
         <p:txBody>
           <a:bodyPr>
             <a:normAutofit/>
           </a:bodyPr>
           <a:lstStyle/>
           <a:p>
-            <a:pPr marL="0" indent="0">
-              <a:buNone/>
-            </a:pPr>
-            <a:endParaRPr lang="en-IN" sz="1400" dirty="0"/>
+            <a:r>
+              <a:rPr lang="en-IN" sz="3200" b="1" dirty="0"/>
+              <a:t>Data </a:t>
+            </a:r>
+            <a:r>
+              <a:rPr lang="en-IN" sz="2800" b="1" dirty="0"/>
+              <a:t>Understanding</a:t>
+            </a:r>
+            <a:r>
+              <a:rPr lang="en-IN" sz="3200" b="1" dirty="0"/>
+              <a:t>	</a:t>
+            </a:r>
           </a:p>
         </p:txBody>
       </p:sp>
     </p:spTree>
     <p:extLst>
       <p:ext uri="{BB962C8B-B14F-4D97-AF65-F5344CB8AC3E}">
-        <p14:creationId xmlns:p14="http://schemas.microsoft.com/office/powerpoint/2010/main" val="1302983225"/>
+        <p14:creationId xmlns:p14="http://schemas.microsoft.com/office/powerpoint/2010/main" val="2442211255"/>
       </p:ext>
     </p:extLst>
   </p:cSld>
@@ -4006,32 +5093,6 @@
       </p:grpSpPr>
       <p:sp>
         <p:nvSpPr>
-          <p:cNvPr id="2" name="Title 1"/>
-          <p:cNvSpPr>
-            <a:spLocks noGrp="1"/>
-          </p:cNvSpPr>
-          <p:nvPr>
-            <p:ph type="title"/>
-          </p:nvPr>
-        </p:nvSpPr>
-        <p:spPr/>
-        <p:txBody>
-          <a:bodyPr/>
-          <a:lstStyle/>
-          <a:p>
-            <a:r>
-              <a:rPr lang="en-IN" b="1" dirty="0"/>
-              <a:t> </a:t>
-            </a:r>
-            <a:r>
-              <a:rPr lang="en-IN" sz="2800" dirty="0"/>
-              <a:t>&lt;Analysis&gt;</a:t>
-            </a:r>
-          </a:p>
-        </p:txBody>
-      </p:sp>
-      <p:sp>
-        <p:nvSpPr>
           <p:cNvPr id="3" name="Content Placeholder 2"/>
           <p:cNvSpPr>
             <a:spLocks noGrp="1"/>
@@ -4050,14 +5111,101 @@
             <a:pPr marL="0" indent="0">
               <a:buNone/>
             </a:pPr>
-            <a:endParaRPr lang="en-IN" sz="1400" dirty="0"/>
+            <a:r>
+              <a:rPr lang="en-IN" sz="1600" b="1" dirty="0"/>
+              <a:t>Missing value treatment</a:t>
+            </a:r>
+          </a:p>
+          <a:p>
+            <a:pPr lvl="1"/>
+            <a:r>
+              <a:rPr lang="en-IN" sz="1600" dirty="0" err="1"/>
+              <a:t>raised_amount_usd</a:t>
+            </a:r>
+            <a:r>
+              <a:rPr lang="en-IN" sz="1600" dirty="0"/>
+              <a:t> column in the rounds2 data, which is required in the analysis, had a lot of null values</a:t>
+            </a:r>
+          </a:p>
+          <a:p>
+            <a:pPr lvl="1"/>
+            <a:r>
+              <a:rPr lang="en-IN" sz="1600" dirty="0"/>
+              <a:t>Two possible approaches</a:t>
+            </a:r>
+          </a:p>
+          <a:p>
+            <a:pPr lvl="2"/>
+            <a:r>
+              <a:rPr lang="en-IN" sz="1600" dirty="0"/>
+              <a:t>Approach 1 – Remove the rows with null values for </a:t>
+            </a:r>
+            <a:r>
+              <a:rPr lang="en-IN" sz="1600" dirty="0" err="1"/>
+              <a:t>raised_amount_usd</a:t>
+            </a:r>
+            <a:endParaRPr lang="en-IN" sz="1600" dirty="0"/>
+          </a:p>
+          <a:p>
+            <a:pPr lvl="2"/>
+            <a:r>
+              <a:rPr lang="en-IN" sz="1600" dirty="0"/>
+              <a:t>Approach 2 -  Update all the null values for </a:t>
+            </a:r>
+            <a:r>
+              <a:rPr lang="en-IN" sz="1600" dirty="0" err="1"/>
+              <a:t>raised_amount_usd</a:t>
+            </a:r>
+            <a:r>
+              <a:rPr lang="en-IN" sz="1600" dirty="0"/>
+              <a:t> column with the 75% percentile value	</a:t>
+            </a:r>
+            <a:r>
+              <a:rPr lang="en-IN" sz="1200" b="1" dirty="0"/>
+              <a:t>	</a:t>
+            </a:r>
+          </a:p>
+        </p:txBody>
+      </p:sp>
+      <p:sp>
+        <p:nvSpPr>
+          <p:cNvPr id="6" name="Title 1">
+            <a:extLst>
+              <a:ext uri="{FF2B5EF4-FFF2-40B4-BE49-F238E27FC236}">
+                <a16:creationId xmlns:a16="http://schemas.microsoft.com/office/drawing/2014/main" id="{C9ED24FB-F1DF-43A2-A28A-E1B9714DF31A}"/>
+              </a:ext>
+            </a:extLst>
+          </p:cNvPr>
+          <p:cNvSpPr>
+            <a:spLocks noGrp="1"/>
+          </p:cNvSpPr>
+          <p:nvPr>
+            <p:ph type="title"/>
+          </p:nvPr>
+        </p:nvSpPr>
+        <p:spPr>
+          <a:xfrm>
+            <a:off x="404949" y="800336"/>
+            <a:ext cx="11168742" cy="856138"/>
+          </a:xfrm>
+        </p:spPr>
+        <p:txBody>
+          <a:bodyPr>
+            <a:normAutofit/>
+          </a:bodyPr>
+          <a:lstStyle/>
+          <a:p>
+            <a:r>
+              <a:rPr lang="en-IN" sz="3600" b="1" dirty="0"/>
+              <a:t>Data Preparation	</a:t>
+            </a:r>
           </a:p>
         </p:txBody>
       </p:sp>
     </p:spTree>
     <p:extLst>
       <p:ext uri="{BB962C8B-B14F-4D97-AF65-F5344CB8AC3E}">
-        <p14:creationId xmlns:p14="http://schemas.microsoft.com/office/powerpoint/2010/main" val="567511567"/>
+        <p14:creationId xmlns:p14="http://schemas.microsoft.com/office/powerpoint/2010/main" val="623357653"/>
       </p:ext>
     </p:extLst>
   </p:cSld>
@@ -4101,19 +5249,22 @@
           </a:bodyPr>
           <a:lstStyle/>
           <a:p>
-            <a:pPr marL="0" indent="0">
-              <a:buNone/>
-            </a:pPr>
-            <a:r>
-              <a:rPr lang="en-IN" sz="1800" dirty="0"/>
-              <a:t>Plot 1</a:t>
-            </a:r>
-          </a:p>
-        </p:txBody>
-      </p:sp>
-      <p:sp>
-        <p:nvSpPr>
-          <p:cNvPr id="6" name="Title 1"/>
+            <a:r>
+              <a:rPr lang="en-IN" sz="1600" dirty="0"/>
+              <a:t>Tables from the excel sheet ? </a:t>
+            </a:r>
+          </a:p>
+        </p:txBody>
+      </p:sp>
+      <p:sp>
+        <p:nvSpPr>
+          <p:cNvPr id="6" name="Title 1">
+            <a:extLst>
+              <a:ext uri="{FF2B5EF4-FFF2-40B4-BE49-F238E27FC236}">
+                <a16:creationId xmlns:a16="http://schemas.microsoft.com/office/drawing/2014/main" id="{C9ED24FB-F1DF-43A2-A28A-E1B9714DF31A}"/>
+              </a:ext>
+            </a:extLst>
+          </p:cNvPr>
           <p:cNvSpPr>
             <a:spLocks noGrp="1"/>
           </p:cNvSpPr>
@@ -4123,21 +5274,19 @@
         </p:nvSpPr>
         <p:spPr>
           <a:xfrm>
-            <a:off x="1136469" y="640080"/>
-            <a:ext cx="9313817" cy="856138"/>
+            <a:off x="404949" y="800336"/>
+            <a:ext cx="11168742" cy="856138"/>
           </a:xfrm>
         </p:spPr>
         <p:txBody>
-          <a:bodyPr/>
-          <a:lstStyle/>
-          <a:p>
-            <a:r>
-              <a:rPr lang="en-IN" b="1" dirty="0"/>
-              <a:t> </a:t>
-            </a:r>
-            <a:r>
-              <a:rPr lang="en-IN" sz="2800" dirty="0"/>
-              <a:t>&lt;Results&gt;</a:t>
+          <a:bodyPr>
+            <a:normAutofit/>
+          </a:bodyPr>
+          <a:lstStyle/>
+          <a:p>
+            <a:r>
+              <a:rPr lang="en-IN" sz="3600" b="1" dirty="0"/>
+              <a:t>Data Analysis	</a:t>
             </a:r>
           </a:p>
         </p:txBody>
@@ -4145,7 +5294,7 @@
     </p:spTree>
     <p:extLst>
       <p:ext uri="{BB962C8B-B14F-4D97-AF65-F5344CB8AC3E}">
-        <p14:creationId xmlns:p14="http://schemas.microsoft.com/office/powerpoint/2010/main" val="1739856806"/>
+        <p14:creationId xmlns:p14="http://schemas.microsoft.com/office/powerpoint/2010/main" val="708560008"/>
       </p:ext>
     </p:extLst>
   </p:cSld>
@@ -4174,33 +5323,6 @@
       </p:grpSpPr>
       <p:sp>
         <p:nvSpPr>
-          <p:cNvPr id="3" name="Content Placeholder 2"/>
-          <p:cNvSpPr>
-            <a:spLocks noGrp="1"/>
-          </p:cNvSpPr>
-          <p:nvPr>
-            <p:ph idx="1"/>
-          </p:nvPr>
-        </p:nvSpPr>
-        <p:spPr/>
-        <p:txBody>
-          <a:bodyPr>
-            <a:normAutofit/>
-          </a:bodyPr>
-          <a:lstStyle/>
-          <a:p>
-            <a:pPr marL="0" indent="0">
-              <a:buNone/>
-            </a:pPr>
-            <a:r>
-              <a:rPr lang="en-IN" sz="1800" dirty="0"/>
-              <a:t>Plot 2</a:t>
-            </a:r>
-          </a:p>
-        </p:txBody>
-      </p:sp>
-      <p:sp>
-        <p:nvSpPr>
           <p:cNvPr id="6" name="Title 1"/>
           <p:cNvSpPr>
             <a:spLocks noGrp="1"/>
@@ -4224,16 +5346,17 @@
               <a:t> </a:t>
             </a:r>
             <a:r>
-              <a:rPr lang="en-IN" sz="2800" dirty="0"/>
-              <a:t>&lt;Results&gt;</a:t>
-            </a:r>
+              <a:rPr lang="en-IN" sz="2800" b="1" dirty="0"/>
+              <a:t>Plot 1 – Investments across funding types</a:t>
+            </a:r>
+            <a:endParaRPr lang="en-IN" sz="2800" dirty="0"/>
           </a:p>
         </p:txBody>
       </p:sp>
     </p:spTree>
     <p:extLst>
       <p:ext uri="{BB962C8B-B14F-4D97-AF65-F5344CB8AC3E}">
-        <p14:creationId xmlns:p14="http://schemas.microsoft.com/office/powerpoint/2010/main" val="3733554285"/>
+        <p14:creationId xmlns:p14="http://schemas.microsoft.com/office/powerpoint/2010/main" val="1739856806"/>
       </p:ext>
     </p:extLst>
   </p:cSld>
@@ -4262,33 +5385,6 @@
       </p:grpSpPr>
       <p:sp>
         <p:nvSpPr>
-          <p:cNvPr id="3" name="Content Placeholder 2"/>
-          <p:cNvSpPr>
-            <a:spLocks noGrp="1"/>
-          </p:cNvSpPr>
-          <p:nvPr>
-            <p:ph idx="1"/>
-          </p:nvPr>
-        </p:nvSpPr>
-        <p:spPr/>
-        <p:txBody>
-          <a:bodyPr>
-            <a:normAutofit/>
-          </a:bodyPr>
-          <a:lstStyle/>
-          <a:p>
-            <a:pPr marL="0" indent="0">
-              <a:buNone/>
-            </a:pPr>
-            <a:r>
-              <a:rPr lang="en-IN" sz="1800" dirty="0"/>
-              <a:t>Plot 3</a:t>
-            </a:r>
-          </a:p>
-        </p:txBody>
-      </p:sp>
-      <p:sp>
-        <p:nvSpPr>
           <p:cNvPr id="6" name="Title 1"/>
           <p:cNvSpPr>
             <a:spLocks noGrp="1"/>
@@ -4312,16 +5408,17 @@
               <a:t> </a:t>
             </a:r>
             <a:r>
-              <a:rPr lang="en-IN" sz="2800" dirty="0"/>
-              <a:t>&lt;Results&gt;</a:t>
-            </a:r>
+              <a:rPr lang="en-IN" sz="2800" b="1" dirty="0"/>
+              <a:t>Plot 2 – Venture funding investments across countries</a:t>
+            </a:r>
+            <a:endParaRPr lang="en-IN" sz="2800" dirty="0"/>
           </a:p>
         </p:txBody>
       </p:sp>
     </p:spTree>
     <p:extLst>
       <p:ext uri="{BB962C8B-B14F-4D97-AF65-F5344CB8AC3E}">
-        <p14:creationId xmlns:p14="http://schemas.microsoft.com/office/powerpoint/2010/main" val="1057818561"/>
+        <p14:creationId xmlns:p14="http://schemas.microsoft.com/office/powerpoint/2010/main" val="4159264894"/>
       </p:ext>
     </p:extLst>
   </p:cSld>

</xml_diff>